<commit_message>
modified ppt meat dealer
</commit_message>
<xml_diff>
--- a/MEAT-DEALERS-SIDE.pptx
+++ b/MEAT-DEALERS-SIDE.pptx
@@ -11,13 +11,14 @@
     <p:sldId id="259" r:id="rId5"/>
     <p:sldId id="260" r:id="rId6"/>
     <p:sldId id="261" r:id="rId7"/>
-    <p:sldId id="262" r:id="rId8"/>
-    <p:sldId id="268" r:id="rId9"/>
-    <p:sldId id="263" r:id="rId10"/>
-    <p:sldId id="264" r:id="rId11"/>
-    <p:sldId id="265" r:id="rId12"/>
-    <p:sldId id="266" r:id="rId13"/>
-    <p:sldId id="267" r:id="rId14"/>
+    <p:sldId id="269" r:id="rId8"/>
+    <p:sldId id="262" r:id="rId9"/>
+    <p:sldId id="268" r:id="rId10"/>
+    <p:sldId id="263" r:id="rId11"/>
+    <p:sldId id="264" r:id="rId12"/>
+    <p:sldId id="265" r:id="rId13"/>
+    <p:sldId id="266" r:id="rId14"/>
+    <p:sldId id="267" r:id="rId15"/>
   </p:sldIdLst>
   <p:sldSz cx="12192000" cy="6858000"/>
   <p:notesSz cx="6858000" cy="9144000"/>
@@ -116,6 +117,11 @@
       </a:defRPr>
     </a:lvl9pPr>
   </p:defaultTextStyle>
+  <p:extLst>
+    <p:ext uri="{EFAFB233-063F-42B5-8137-9DF3F51BA10A}">
+      <p15:sldGuideLst xmlns:p15="http://schemas.microsoft.com/office/powerpoint/2012/main"/>
+    </p:ext>
+  </p:extLst>
 </p:presentation>
 </file>
 
@@ -141,7 +147,7 @@
           <p:cNvPr id="2" name="Title 1">
             <a:extLst>
               <a:ext uri="{FF2B5EF4-FFF2-40B4-BE49-F238E27FC236}">
-                <a16:creationId xmlns:a16="http://schemas.microsoft.com/office/drawing/2014/main" id="{AEFAB28D-3F38-487F-8FF3-7DDBEAB11529}"/>
+                <a16:creationId xmlns:a16="http://schemas.microsoft.com/office/drawing/2014/main" xmlns="" id="{AEFAB28D-3F38-487F-8FF3-7DDBEAB11529}"/>
               </a:ext>
             </a:extLst>
           </p:cNvPr>
@@ -179,7 +185,7 @@
           <p:cNvPr id="3" name="Subtitle 2">
             <a:extLst>
               <a:ext uri="{FF2B5EF4-FFF2-40B4-BE49-F238E27FC236}">
-                <a16:creationId xmlns:a16="http://schemas.microsoft.com/office/drawing/2014/main" id="{55505F60-9E37-438D-8D02-DBEA6F4419BB}"/>
+                <a16:creationId xmlns:a16="http://schemas.microsoft.com/office/drawing/2014/main" xmlns="" id="{55505F60-9E37-438D-8D02-DBEA6F4419BB}"/>
               </a:ext>
             </a:extLst>
           </p:cNvPr>
@@ -250,7 +256,7 @@
           <p:cNvPr id="4" name="Date Placeholder 3">
             <a:extLst>
               <a:ext uri="{FF2B5EF4-FFF2-40B4-BE49-F238E27FC236}">
-                <a16:creationId xmlns:a16="http://schemas.microsoft.com/office/drawing/2014/main" id="{764104BB-26C8-4D6A-8D4A-FEA7AEB77CBA}"/>
+                <a16:creationId xmlns:a16="http://schemas.microsoft.com/office/drawing/2014/main" xmlns="" id="{764104BB-26C8-4D6A-8D4A-FEA7AEB77CBA}"/>
               </a:ext>
             </a:extLst>
           </p:cNvPr>
@@ -268,7 +274,7 @@
           <a:p>
             <a:fld id="{2B0739BF-12DF-4C9B-B87C-6D53AC7E35F9}" type="datetimeFigureOut">
               <a:rPr lang="en-PH" smtClean="0"/>
-              <a:t>17/11/2021</a:t>
+              <a:t>11/12/2021</a:t>
             </a:fld>
             <a:endParaRPr lang="en-PH"/>
           </a:p>
@@ -279,7 +285,7 @@
           <p:cNvPr id="5" name="Footer Placeholder 4">
             <a:extLst>
               <a:ext uri="{FF2B5EF4-FFF2-40B4-BE49-F238E27FC236}">
-                <a16:creationId xmlns:a16="http://schemas.microsoft.com/office/drawing/2014/main" id="{AC035B90-59C1-4C1D-A2D7-23132E66664F}"/>
+                <a16:creationId xmlns:a16="http://schemas.microsoft.com/office/drawing/2014/main" xmlns="" id="{AC035B90-59C1-4C1D-A2D7-23132E66664F}"/>
               </a:ext>
             </a:extLst>
           </p:cNvPr>
@@ -304,7 +310,7 @@
           <p:cNvPr id="6" name="Slide Number Placeholder 5">
             <a:extLst>
               <a:ext uri="{FF2B5EF4-FFF2-40B4-BE49-F238E27FC236}">
-                <a16:creationId xmlns:a16="http://schemas.microsoft.com/office/drawing/2014/main" id="{AE80B0EE-49CF-4B7D-95B2-17F8642861BC}"/>
+                <a16:creationId xmlns:a16="http://schemas.microsoft.com/office/drawing/2014/main" xmlns="" id="{AE80B0EE-49CF-4B7D-95B2-17F8642861BC}"/>
               </a:ext>
             </a:extLst>
           </p:cNvPr>
@@ -363,7 +369,7 @@
           <p:cNvPr id="2" name="Title 1">
             <a:extLst>
               <a:ext uri="{FF2B5EF4-FFF2-40B4-BE49-F238E27FC236}">
-                <a16:creationId xmlns:a16="http://schemas.microsoft.com/office/drawing/2014/main" id="{302A2635-7D71-4C7D-9354-0F5DD7AA59CE}"/>
+                <a16:creationId xmlns:a16="http://schemas.microsoft.com/office/drawing/2014/main" xmlns="" id="{302A2635-7D71-4C7D-9354-0F5DD7AA59CE}"/>
               </a:ext>
             </a:extLst>
           </p:cNvPr>
@@ -392,7 +398,7 @@
           <p:cNvPr id="3" name="Vertical Text Placeholder 2">
             <a:extLst>
               <a:ext uri="{FF2B5EF4-FFF2-40B4-BE49-F238E27FC236}">
-                <a16:creationId xmlns:a16="http://schemas.microsoft.com/office/drawing/2014/main" id="{7DD2A621-AC32-45C6-8415-1D551C0F029B}"/>
+                <a16:creationId xmlns:a16="http://schemas.microsoft.com/office/drawing/2014/main" xmlns="" id="{7DD2A621-AC32-45C6-8415-1D551C0F029B}"/>
               </a:ext>
             </a:extLst>
           </p:cNvPr>
@@ -450,7 +456,7 @@
           <p:cNvPr id="4" name="Date Placeholder 3">
             <a:extLst>
               <a:ext uri="{FF2B5EF4-FFF2-40B4-BE49-F238E27FC236}">
-                <a16:creationId xmlns:a16="http://schemas.microsoft.com/office/drawing/2014/main" id="{D67A7F5D-35A3-4312-AFE8-029545DC850D}"/>
+                <a16:creationId xmlns:a16="http://schemas.microsoft.com/office/drawing/2014/main" xmlns="" id="{D67A7F5D-35A3-4312-AFE8-029545DC850D}"/>
               </a:ext>
             </a:extLst>
           </p:cNvPr>
@@ -468,7 +474,7 @@
           <a:p>
             <a:fld id="{2B0739BF-12DF-4C9B-B87C-6D53AC7E35F9}" type="datetimeFigureOut">
               <a:rPr lang="en-PH" smtClean="0"/>
-              <a:t>17/11/2021</a:t>
+              <a:t>11/12/2021</a:t>
             </a:fld>
             <a:endParaRPr lang="en-PH"/>
           </a:p>
@@ -479,7 +485,7 @@
           <p:cNvPr id="5" name="Footer Placeholder 4">
             <a:extLst>
               <a:ext uri="{FF2B5EF4-FFF2-40B4-BE49-F238E27FC236}">
-                <a16:creationId xmlns:a16="http://schemas.microsoft.com/office/drawing/2014/main" id="{4D8D240A-6E6E-4797-A13E-FF564CCB7277}"/>
+                <a16:creationId xmlns:a16="http://schemas.microsoft.com/office/drawing/2014/main" xmlns="" id="{4D8D240A-6E6E-4797-A13E-FF564CCB7277}"/>
               </a:ext>
             </a:extLst>
           </p:cNvPr>
@@ -504,7 +510,7 @@
           <p:cNvPr id="6" name="Slide Number Placeholder 5">
             <a:extLst>
               <a:ext uri="{FF2B5EF4-FFF2-40B4-BE49-F238E27FC236}">
-                <a16:creationId xmlns:a16="http://schemas.microsoft.com/office/drawing/2014/main" id="{E5AF8BA3-4AC7-4B91-BEE3-C07E5C16DD97}"/>
+                <a16:creationId xmlns:a16="http://schemas.microsoft.com/office/drawing/2014/main" xmlns="" id="{E5AF8BA3-4AC7-4B91-BEE3-C07E5C16DD97}"/>
               </a:ext>
             </a:extLst>
           </p:cNvPr>
@@ -563,7 +569,7 @@
           <p:cNvPr id="2" name="Vertical Title 1">
             <a:extLst>
               <a:ext uri="{FF2B5EF4-FFF2-40B4-BE49-F238E27FC236}">
-                <a16:creationId xmlns:a16="http://schemas.microsoft.com/office/drawing/2014/main" id="{B0B19B86-C7C7-46F5-970E-C4E1764BE47C}"/>
+                <a16:creationId xmlns:a16="http://schemas.microsoft.com/office/drawing/2014/main" xmlns="" id="{B0B19B86-C7C7-46F5-970E-C4E1764BE47C}"/>
               </a:ext>
             </a:extLst>
           </p:cNvPr>
@@ -597,7 +603,7 @@
           <p:cNvPr id="3" name="Vertical Text Placeholder 2">
             <a:extLst>
               <a:ext uri="{FF2B5EF4-FFF2-40B4-BE49-F238E27FC236}">
-                <a16:creationId xmlns:a16="http://schemas.microsoft.com/office/drawing/2014/main" id="{50DB03BF-F166-4639-97F0-CB482ED97920}"/>
+                <a16:creationId xmlns:a16="http://schemas.microsoft.com/office/drawing/2014/main" xmlns="" id="{50DB03BF-F166-4639-97F0-CB482ED97920}"/>
               </a:ext>
             </a:extLst>
           </p:cNvPr>
@@ -660,7 +666,7 @@
           <p:cNvPr id="4" name="Date Placeholder 3">
             <a:extLst>
               <a:ext uri="{FF2B5EF4-FFF2-40B4-BE49-F238E27FC236}">
-                <a16:creationId xmlns:a16="http://schemas.microsoft.com/office/drawing/2014/main" id="{E467A6D5-93EF-4E76-8416-87AC3C71FB6D}"/>
+                <a16:creationId xmlns:a16="http://schemas.microsoft.com/office/drawing/2014/main" xmlns="" id="{E467A6D5-93EF-4E76-8416-87AC3C71FB6D}"/>
               </a:ext>
             </a:extLst>
           </p:cNvPr>
@@ -678,7 +684,7 @@
           <a:p>
             <a:fld id="{2B0739BF-12DF-4C9B-B87C-6D53AC7E35F9}" type="datetimeFigureOut">
               <a:rPr lang="en-PH" smtClean="0"/>
-              <a:t>17/11/2021</a:t>
+              <a:t>11/12/2021</a:t>
             </a:fld>
             <a:endParaRPr lang="en-PH"/>
           </a:p>
@@ -689,7 +695,7 @@
           <p:cNvPr id="5" name="Footer Placeholder 4">
             <a:extLst>
               <a:ext uri="{FF2B5EF4-FFF2-40B4-BE49-F238E27FC236}">
-                <a16:creationId xmlns:a16="http://schemas.microsoft.com/office/drawing/2014/main" id="{2E44309F-938E-426A-BF95-5A9A767EAD59}"/>
+                <a16:creationId xmlns:a16="http://schemas.microsoft.com/office/drawing/2014/main" xmlns="" id="{2E44309F-938E-426A-BF95-5A9A767EAD59}"/>
               </a:ext>
             </a:extLst>
           </p:cNvPr>
@@ -714,7 +720,7 @@
           <p:cNvPr id="6" name="Slide Number Placeholder 5">
             <a:extLst>
               <a:ext uri="{FF2B5EF4-FFF2-40B4-BE49-F238E27FC236}">
-                <a16:creationId xmlns:a16="http://schemas.microsoft.com/office/drawing/2014/main" id="{62458DE1-2E67-45E8-98DE-B89299212D60}"/>
+                <a16:creationId xmlns:a16="http://schemas.microsoft.com/office/drawing/2014/main" xmlns="" id="{62458DE1-2E67-45E8-98DE-B89299212D60}"/>
               </a:ext>
             </a:extLst>
           </p:cNvPr>
@@ -773,7 +779,7 @@
           <p:cNvPr id="2" name="Title 1">
             <a:extLst>
               <a:ext uri="{FF2B5EF4-FFF2-40B4-BE49-F238E27FC236}">
-                <a16:creationId xmlns:a16="http://schemas.microsoft.com/office/drawing/2014/main" id="{8B9068D2-5D34-412D-A44D-522C9381A1F8}"/>
+                <a16:creationId xmlns:a16="http://schemas.microsoft.com/office/drawing/2014/main" xmlns="" id="{8B9068D2-5D34-412D-A44D-522C9381A1F8}"/>
               </a:ext>
             </a:extLst>
           </p:cNvPr>
@@ -802,7 +808,7 @@
           <p:cNvPr id="3" name="Content Placeholder 2">
             <a:extLst>
               <a:ext uri="{FF2B5EF4-FFF2-40B4-BE49-F238E27FC236}">
-                <a16:creationId xmlns:a16="http://schemas.microsoft.com/office/drawing/2014/main" id="{A6E48A04-0BB6-4D2F-9ACF-DE5C0FA412DE}"/>
+                <a16:creationId xmlns:a16="http://schemas.microsoft.com/office/drawing/2014/main" xmlns="" id="{A6E48A04-0BB6-4D2F-9ACF-DE5C0FA412DE}"/>
               </a:ext>
             </a:extLst>
           </p:cNvPr>
@@ -860,7 +866,7 @@
           <p:cNvPr id="4" name="Date Placeholder 3">
             <a:extLst>
               <a:ext uri="{FF2B5EF4-FFF2-40B4-BE49-F238E27FC236}">
-                <a16:creationId xmlns:a16="http://schemas.microsoft.com/office/drawing/2014/main" id="{E2014A80-0BCB-4368-A5D8-1BEC1DB863A7}"/>
+                <a16:creationId xmlns:a16="http://schemas.microsoft.com/office/drawing/2014/main" xmlns="" id="{E2014A80-0BCB-4368-A5D8-1BEC1DB863A7}"/>
               </a:ext>
             </a:extLst>
           </p:cNvPr>
@@ -878,7 +884,7 @@
           <a:p>
             <a:fld id="{2B0739BF-12DF-4C9B-B87C-6D53AC7E35F9}" type="datetimeFigureOut">
               <a:rPr lang="en-PH" smtClean="0"/>
-              <a:t>17/11/2021</a:t>
+              <a:t>11/12/2021</a:t>
             </a:fld>
             <a:endParaRPr lang="en-PH"/>
           </a:p>
@@ -889,7 +895,7 @@
           <p:cNvPr id="5" name="Footer Placeholder 4">
             <a:extLst>
               <a:ext uri="{FF2B5EF4-FFF2-40B4-BE49-F238E27FC236}">
-                <a16:creationId xmlns:a16="http://schemas.microsoft.com/office/drawing/2014/main" id="{74BCC75A-6805-4BB2-BE18-B05D28C2A0FC}"/>
+                <a16:creationId xmlns:a16="http://schemas.microsoft.com/office/drawing/2014/main" xmlns="" id="{74BCC75A-6805-4BB2-BE18-B05D28C2A0FC}"/>
               </a:ext>
             </a:extLst>
           </p:cNvPr>
@@ -914,7 +920,7 @@
           <p:cNvPr id="6" name="Slide Number Placeholder 5">
             <a:extLst>
               <a:ext uri="{FF2B5EF4-FFF2-40B4-BE49-F238E27FC236}">
-                <a16:creationId xmlns:a16="http://schemas.microsoft.com/office/drawing/2014/main" id="{D3106ACC-0642-45BC-9E38-FDE6D469B04A}"/>
+                <a16:creationId xmlns:a16="http://schemas.microsoft.com/office/drawing/2014/main" xmlns="" id="{D3106ACC-0642-45BC-9E38-FDE6D469B04A}"/>
               </a:ext>
             </a:extLst>
           </p:cNvPr>
@@ -973,7 +979,7 @@
           <p:cNvPr id="2" name="Title 1">
             <a:extLst>
               <a:ext uri="{FF2B5EF4-FFF2-40B4-BE49-F238E27FC236}">
-                <a16:creationId xmlns:a16="http://schemas.microsoft.com/office/drawing/2014/main" id="{AE4B1505-F3EE-4424-9170-5F6B4ACE218A}"/>
+                <a16:creationId xmlns:a16="http://schemas.microsoft.com/office/drawing/2014/main" xmlns="" id="{AE4B1505-F3EE-4424-9170-5F6B4ACE218A}"/>
               </a:ext>
             </a:extLst>
           </p:cNvPr>
@@ -1011,7 +1017,7 @@
           <p:cNvPr id="3" name="Text Placeholder 2">
             <a:extLst>
               <a:ext uri="{FF2B5EF4-FFF2-40B4-BE49-F238E27FC236}">
-                <a16:creationId xmlns:a16="http://schemas.microsoft.com/office/drawing/2014/main" id="{FA8D02B0-E97B-41AB-B37C-63353A3607CA}"/>
+                <a16:creationId xmlns:a16="http://schemas.microsoft.com/office/drawing/2014/main" xmlns="" id="{FA8D02B0-E97B-41AB-B37C-63353A3607CA}"/>
               </a:ext>
             </a:extLst>
           </p:cNvPr>
@@ -1136,7 +1142,7 @@
           <p:cNvPr id="4" name="Date Placeholder 3">
             <a:extLst>
               <a:ext uri="{FF2B5EF4-FFF2-40B4-BE49-F238E27FC236}">
-                <a16:creationId xmlns:a16="http://schemas.microsoft.com/office/drawing/2014/main" id="{3CCCB13E-8AEC-4007-8C56-A8C90E514D9D}"/>
+                <a16:creationId xmlns:a16="http://schemas.microsoft.com/office/drawing/2014/main" xmlns="" id="{3CCCB13E-8AEC-4007-8C56-A8C90E514D9D}"/>
               </a:ext>
             </a:extLst>
           </p:cNvPr>
@@ -1154,7 +1160,7 @@
           <a:p>
             <a:fld id="{2B0739BF-12DF-4C9B-B87C-6D53AC7E35F9}" type="datetimeFigureOut">
               <a:rPr lang="en-PH" smtClean="0"/>
-              <a:t>17/11/2021</a:t>
+              <a:t>11/12/2021</a:t>
             </a:fld>
             <a:endParaRPr lang="en-PH"/>
           </a:p>
@@ -1165,7 +1171,7 @@
           <p:cNvPr id="5" name="Footer Placeholder 4">
             <a:extLst>
               <a:ext uri="{FF2B5EF4-FFF2-40B4-BE49-F238E27FC236}">
-                <a16:creationId xmlns:a16="http://schemas.microsoft.com/office/drawing/2014/main" id="{15E1A76E-70AA-4BCF-940F-44D5C80AA499}"/>
+                <a16:creationId xmlns:a16="http://schemas.microsoft.com/office/drawing/2014/main" xmlns="" id="{15E1A76E-70AA-4BCF-940F-44D5C80AA499}"/>
               </a:ext>
             </a:extLst>
           </p:cNvPr>
@@ -1190,7 +1196,7 @@
           <p:cNvPr id="6" name="Slide Number Placeholder 5">
             <a:extLst>
               <a:ext uri="{FF2B5EF4-FFF2-40B4-BE49-F238E27FC236}">
-                <a16:creationId xmlns:a16="http://schemas.microsoft.com/office/drawing/2014/main" id="{6CD2F3DA-EFAB-41C7-AA4A-A341BB06BAFC}"/>
+                <a16:creationId xmlns:a16="http://schemas.microsoft.com/office/drawing/2014/main" xmlns="" id="{6CD2F3DA-EFAB-41C7-AA4A-A341BB06BAFC}"/>
               </a:ext>
             </a:extLst>
           </p:cNvPr>
@@ -1249,7 +1255,7 @@
           <p:cNvPr id="2" name="Title 1">
             <a:extLst>
               <a:ext uri="{FF2B5EF4-FFF2-40B4-BE49-F238E27FC236}">
-                <a16:creationId xmlns:a16="http://schemas.microsoft.com/office/drawing/2014/main" id="{182AE38C-2FD5-49CB-87E5-CB7EEC19647B}"/>
+                <a16:creationId xmlns:a16="http://schemas.microsoft.com/office/drawing/2014/main" xmlns="" id="{182AE38C-2FD5-49CB-87E5-CB7EEC19647B}"/>
               </a:ext>
             </a:extLst>
           </p:cNvPr>
@@ -1278,7 +1284,7 @@
           <p:cNvPr id="3" name="Content Placeholder 2">
             <a:extLst>
               <a:ext uri="{FF2B5EF4-FFF2-40B4-BE49-F238E27FC236}">
-                <a16:creationId xmlns:a16="http://schemas.microsoft.com/office/drawing/2014/main" id="{979ED4CE-7889-48D5-BCD7-79C7C4CB0B83}"/>
+                <a16:creationId xmlns:a16="http://schemas.microsoft.com/office/drawing/2014/main" xmlns="" id="{979ED4CE-7889-48D5-BCD7-79C7C4CB0B83}"/>
               </a:ext>
             </a:extLst>
           </p:cNvPr>
@@ -1341,7 +1347,7 @@
           <p:cNvPr id="4" name="Content Placeholder 3">
             <a:extLst>
               <a:ext uri="{FF2B5EF4-FFF2-40B4-BE49-F238E27FC236}">
-                <a16:creationId xmlns:a16="http://schemas.microsoft.com/office/drawing/2014/main" id="{7FD97709-EA8F-4D5A-A9E6-CD565BD21876}"/>
+                <a16:creationId xmlns:a16="http://schemas.microsoft.com/office/drawing/2014/main" xmlns="" id="{7FD97709-EA8F-4D5A-A9E6-CD565BD21876}"/>
               </a:ext>
             </a:extLst>
           </p:cNvPr>
@@ -1404,7 +1410,7 @@
           <p:cNvPr id="5" name="Date Placeholder 4">
             <a:extLst>
               <a:ext uri="{FF2B5EF4-FFF2-40B4-BE49-F238E27FC236}">
-                <a16:creationId xmlns:a16="http://schemas.microsoft.com/office/drawing/2014/main" id="{98FDA641-1A3E-404F-B2FF-6072D5A12ED3}"/>
+                <a16:creationId xmlns:a16="http://schemas.microsoft.com/office/drawing/2014/main" xmlns="" id="{98FDA641-1A3E-404F-B2FF-6072D5A12ED3}"/>
               </a:ext>
             </a:extLst>
           </p:cNvPr>
@@ -1422,7 +1428,7 @@
           <a:p>
             <a:fld id="{2B0739BF-12DF-4C9B-B87C-6D53AC7E35F9}" type="datetimeFigureOut">
               <a:rPr lang="en-PH" smtClean="0"/>
-              <a:t>17/11/2021</a:t>
+              <a:t>11/12/2021</a:t>
             </a:fld>
             <a:endParaRPr lang="en-PH"/>
           </a:p>
@@ -1433,7 +1439,7 @@
           <p:cNvPr id="6" name="Footer Placeholder 5">
             <a:extLst>
               <a:ext uri="{FF2B5EF4-FFF2-40B4-BE49-F238E27FC236}">
-                <a16:creationId xmlns:a16="http://schemas.microsoft.com/office/drawing/2014/main" id="{7D108E96-2FC3-4BD0-9ABC-A859E2228A31}"/>
+                <a16:creationId xmlns:a16="http://schemas.microsoft.com/office/drawing/2014/main" xmlns="" id="{7D108E96-2FC3-4BD0-9ABC-A859E2228A31}"/>
               </a:ext>
             </a:extLst>
           </p:cNvPr>
@@ -1458,7 +1464,7 @@
           <p:cNvPr id="7" name="Slide Number Placeholder 6">
             <a:extLst>
               <a:ext uri="{FF2B5EF4-FFF2-40B4-BE49-F238E27FC236}">
-                <a16:creationId xmlns:a16="http://schemas.microsoft.com/office/drawing/2014/main" id="{6F8420BC-B546-45C9-AFA4-1D53732BFC30}"/>
+                <a16:creationId xmlns:a16="http://schemas.microsoft.com/office/drawing/2014/main" xmlns="" id="{6F8420BC-B546-45C9-AFA4-1D53732BFC30}"/>
               </a:ext>
             </a:extLst>
           </p:cNvPr>
@@ -1517,7 +1523,7 @@
           <p:cNvPr id="2" name="Title 1">
             <a:extLst>
               <a:ext uri="{FF2B5EF4-FFF2-40B4-BE49-F238E27FC236}">
-                <a16:creationId xmlns:a16="http://schemas.microsoft.com/office/drawing/2014/main" id="{00EB31E5-C4F6-4ABD-B417-4CDB8664A22B}"/>
+                <a16:creationId xmlns:a16="http://schemas.microsoft.com/office/drawing/2014/main" xmlns="" id="{00EB31E5-C4F6-4ABD-B417-4CDB8664A22B}"/>
               </a:ext>
             </a:extLst>
           </p:cNvPr>
@@ -1551,7 +1557,7 @@
           <p:cNvPr id="3" name="Text Placeholder 2">
             <a:extLst>
               <a:ext uri="{FF2B5EF4-FFF2-40B4-BE49-F238E27FC236}">
-                <a16:creationId xmlns:a16="http://schemas.microsoft.com/office/drawing/2014/main" id="{E95073E4-F0F1-4DF8-96C0-F4EACB0DF556}"/>
+                <a16:creationId xmlns:a16="http://schemas.microsoft.com/office/drawing/2014/main" xmlns="" id="{E95073E4-F0F1-4DF8-96C0-F4EACB0DF556}"/>
               </a:ext>
             </a:extLst>
           </p:cNvPr>
@@ -1622,7 +1628,7 @@
           <p:cNvPr id="4" name="Content Placeholder 3">
             <a:extLst>
               <a:ext uri="{FF2B5EF4-FFF2-40B4-BE49-F238E27FC236}">
-                <a16:creationId xmlns:a16="http://schemas.microsoft.com/office/drawing/2014/main" id="{D151C007-338F-4078-A520-54AE95BE8C3A}"/>
+                <a16:creationId xmlns:a16="http://schemas.microsoft.com/office/drawing/2014/main" xmlns="" id="{D151C007-338F-4078-A520-54AE95BE8C3A}"/>
               </a:ext>
             </a:extLst>
           </p:cNvPr>
@@ -1685,7 +1691,7 @@
           <p:cNvPr id="5" name="Text Placeholder 4">
             <a:extLst>
               <a:ext uri="{FF2B5EF4-FFF2-40B4-BE49-F238E27FC236}">
-                <a16:creationId xmlns:a16="http://schemas.microsoft.com/office/drawing/2014/main" id="{C5F33290-BC30-4E09-BA96-3586E5CD5B2B}"/>
+                <a16:creationId xmlns:a16="http://schemas.microsoft.com/office/drawing/2014/main" xmlns="" id="{C5F33290-BC30-4E09-BA96-3586E5CD5B2B}"/>
               </a:ext>
             </a:extLst>
           </p:cNvPr>
@@ -1756,7 +1762,7 @@
           <p:cNvPr id="6" name="Content Placeholder 5">
             <a:extLst>
               <a:ext uri="{FF2B5EF4-FFF2-40B4-BE49-F238E27FC236}">
-                <a16:creationId xmlns:a16="http://schemas.microsoft.com/office/drawing/2014/main" id="{369559E7-521D-490D-A638-4A9C4699D7D6}"/>
+                <a16:creationId xmlns:a16="http://schemas.microsoft.com/office/drawing/2014/main" xmlns="" id="{369559E7-521D-490D-A638-4A9C4699D7D6}"/>
               </a:ext>
             </a:extLst>
           </p:cNvPr>
@@ -1819,7 +1825,7 @@
           <p:cNvPr id="7" name="Date Placeholder 6">
             <a:extLst>
               <a:ext uri="{FF2B5EF4-FFF2-40B4-BE49-F238E27FC236}">
-                <a16:creationId xmlns:a16="http://schemas.microsoft.com/office/drawing/2014/main" id="{30C06177-64FC-40F2-86BB-8FAC2A0905FC}"/>
+                <a16:creationId xmlns:a16="http://schemas.microsoft.com/office/drawing/2014/main" xmlns="" id="{30C06177-64FC-40F2-86BB-8FAC2A0905FC}"/>
               </a:ext>
             </a:extLst>
           </p:cNvPr>
@@ -1837,7 +1843,7 @@
           <a:p>
             <a:fld id="{2B0739BF-12DF-4C9B-B87C-6D53AC7E35F9}" type="datetimeFigureOut">
               <a:rPr lang="en-PH" smtClean="0"/>
-              <a:t>17/11/2021</a:t>
+              <a:t>11/12/2021</a:t>
             </a:fld>
             <a:endParaRPr lang="en-PH"/>
           </a:p>
@@ -1848,7 +1854,7 @@
           <p:cNvPr id="8" name="Footer Placeholder 7">
             <a:extLst>
               <a:ext uri="{FF2B5EF4-FFF2-40B4-BE49-F238E27FC236}">
-                <a16:creationId xmlns:a16="http://schemas.microsoft.com/office/drawing/2014/main" id="{A1CCE30C-3C13-4F3A-92CE-332A106D90F6}"/>
+                <a16:creationId xmlns:a16="http://schemas.microsoft.com/office/drawing/2014/main" xmlns="" id="{A1CCE30C-3C13-4F3A-92CE-332A106D90F6}"/>
               </a:ext>
             </a:extLst>
           </p:cNvPr>
@@ -1873,7 +1879,7 @@
           <p:cNvPr id="9" name="Slide Number Placeholder 8">
             <a:extLst>
               <a:ext uri="{FF2B5EF4-FFF2-40B4-BE49-F238E27FC236}">
-                <a16:creationId xmlns:a16="http://schemas.microsoft.com/office/drawing/2014/main" id="{3593F6EB-DFC1-4FFF-BBB8-C6572CEE3A36}"/>
+                <a16:creationId xmlns:a16="http://schemas.microsoft.com/office/drawing/2014/main" xmlns="" id="{3593F6EB-DFC1-4FFF-BBB8-C6572CEE3A36}"/>
               </a:ext>
             </a:extLst>
           </p:cNvPr>
@@ -1932,7 +1938,7 @@
           <p:cNvPr id="2" name="Title 1">
             <a:extLst>
               <a:ext uri="{FF2B5EF4-FFF2-40B4-BE49-F238E27FC236}">
-                <a16:creationId xmlns:a16="http://schemas.microsoft.com/office/drawing/2014/main" id="{0F4A08FE-DAC5-4CF0-9536-09DBAA36C148}"/>
+                <a16:creationId xmlns:a16="http://schemas.microsoft.com/office/drawing/2014/main" xmlns="" id="{0F4A08FE-DAC5-4CF0-9536-09DBAA36C148}"/>
               </a:ext>
             </a:extLst>
           </p:cNvPr>
@@ -1961,7 +1967,7 @@
           <p:cNvPr id="3" name="Date Placeholder 2">
             <a:extLst>
               <a:ext uri="{FF2B5EF4-FFF2-40B4-BE49-F238E27FC236}">
-                <a16:creationId xmlns:a16="http://schemas.microsoft.com/office/drawing/2014/main" id="{80881911-AD73-4939-B4A0-3EC25868468D}"/>
+                <a16:creationId xmlns:a16="http://schemas.microsoft.com/office/drawing/2014/main" xmlns="" id="{80881911-AD73-4939-B4A0-3EC25868468D}"/>
               </a:ext>
             </a:extLst>
           </p:cNvPr>
@@ -1979,7 +1985,7 @@
           <a:p>
             <a:fld id="{2B0739BF-12DF-4C9B-B87C-6D53AC7E35F9}" type="datetimeFigureOut">
               <a:rPr lang="en-PH" smtClean="0"/>
-              <a:t>17/11/2021</a:t>
+              <a:t>11/12/2021</a:t>
             </a:fld>
             <a:endParaRPr lang="en-PH"/>
           </a:p>
@@ -1990,7 +1996,7 @@
           <p:cNvPr id="4" name="Footer Placeholder 3">
             <a:extLst>
               <a:ext uri="{FF2B5EF4-FFF2-40B4-BE49-F238E27FC236}">
-                <a16:creationId xmlns:a16="http://schemas.microsoft.com/office/drawing/2014/main" id="{9C632535-8E2B-4501-B75F-EA0B5E9B97B3}"/>
+                <a16:creationId xmlns:a16="http://schemas.microsoft.com/office/drawing/2014/main" xmlns="" id="{9C632535-8E2B-4501-B75F-EA0B5E9B97B3}"/>
               </a:ext>
             </a:extLst>
           </p:cNvPr>
@@ -2015,7 +2021,7 @@
           <p:cNvPr id="5" name="Slide Number Placeholder 4">
             <a:extLst>
               <a:ext uri="{FF2B5EF4-FFF2-40B4-BE49-F238E27FC236}">
-                <a16:creationId xmlns:a16="http://schemas.microsoft.com/office/drawing/2014/main" id="{B689B6BB-1A12-4672-A5D7-FB672C965FA3}"/>
+                <a16:creationId xmlns:a16="http://schemas.microsoft.com/office/drawing/2014/main" xmlns="" id="{B689B6BB-1A12-4672-A5D7-FB672C965FA3}"/>
               </a:ext>
             </a:extLst>
           </p:cNvPr>
@@ -2074,7 +2080,7 @@
           <p:cNvPr id="2" name="Date Placeholder 1">
             <a:extLst>
               <a:ext uri="{FF2B5EF4-FFF2-40B4-BE49-F238E27FC236}">
-                <a16:creationId xmlns:a16="http://schemas.microsoft.com/office/drawing/2014/main" id="{D48A46A4-DF55-4E03-B2C4-708945143F43}"/>
+                <a16:creationId xmlns:a16="http://schemas.microsoft.com/office/drawing/2014/main" xmlns="" id="{D48A46A4-DF55-4E03-B2C4-708945143F43}"/>
               </a:ext>
             </a:extLst>
           </p:cNvPr>
@@ -2092,7 +2098,7 @@
           <a:p>
             <a:fld id="{2B0739BF-12DF-4C9B-B87C-6D53AC7E35F9}" type="datetimeFigureOut">
               <a:rPr lang="en-PH" smtClean="0"/>
-              <a:t>17/11/2021</a:t>
+              <a:t>11/12/2021</a:t>
             </a:fld>
             <a:endParaRPr lang="en-PH"/>
           </a:p>
@@ -2103,7 +2109,7 @@
           <p:cNvPr id="3" name="Footer Placeholder 2">
             <a:extLst>
               <a:ext uri="{FF2B5EF4-FFF2-40B4-BE49-F238E27FC236}">
-                <a16:creationId xmlns:a16="http://schemas.microsoft.com/office/drawing/2014/main" id="{8AD32AE6-E81D-412D-AAAD-EFB39B670DE0}"/>
+                <a16:creationId xmlns:a16="http://schemas.microsoft.com/office/drawing/2014/main" xmlns="" id="{8AD32AE6-E81D-412D-AAAD-EFB39B670DE0}"/>
               </a:ext>
             </a:extLst>
           </p:cNvPr>
@@ -2128,7 +2134,7 @@
           <p:cNvPr id="4" name="Slide Number Placeholder 3">
             <a:extLst>
               <a:ext uri="{FF2B5EF4-FFF2-40B4-BE49-F238E27FC236}">
-                <a16:creationId xmlns:a16="http://schemas.microsoft.com/office/drawing/2014/main" id="{9B82E6B4-1BF1-4A5F-ADB5-48EB0493EB5D}"/>
+                <a16:creationId xmlns:a16="http://schemas.microsoft.com/office/drawing/2014/main" xmlns="" id="{9B82E6B4-1BF1-4A5F-ADB5-48EB0493EB5D}"/>
               </a:ext>
             </a:extLst>
           </p:cNvPr>
@@ -2187,7 +2193,7 @@
           <p:cNvPr id="2" name="Title 1">
             <a:extLst>
               <a:ext uri="{FF2B5EF4-FFF2-40B4-BE49-F238E27FC236}">
-                <a16:creationId xmlns:a16="http://schemas.microsoft.com/office/drawing/2014/main" id="{10F1C8D6-3936-4EB0-9B31-3267128AAD60}"/>
+                <a16:creationId xmlns:a16="http://schemas.microsoft.com/office/drawing/2014/main" xmlns="" id="{10F1C8D6-3936-4EB0-9B31-3267128AAD60}"/>
               </a:ext>
             </a:extLst>
           </p:cNvPr>
@@ -2225,7 +2231,7 @@
           <p:cNvPr id="3" name="Content Placeholder 2">
             <a:extLst>
               <a:ext uri="{FF2B5EF4-FFF2-40B4-BE49-F238E27FC236}">
-                <a16:creationId xmlns:a16="http://schemas.microsoft.com/office/drawing/2014/main" id="{FF44FB29-650F-43F1-8C71-021971322131}"/>
+                <a16:creationId xmlns:a16="http://schemas.microsoft.com/office/drawing/2014/main" xmlns="" id="{FF44FB29-650F-43F1-8C71-021971322131}"/>
               </a:ext>
             </a:extLst>
           </p:cNvPr>
@@ -2316,7 +2322,7 @@
           <p:cNvPr id="4" name="Text Placeholder 3">
             <a:extLst>
               <a:ext uri="{FF2B5EF4-FFF2-40B4-BE49-F238E27FC236}">
-                <a16:creationId xmlns:a16="http://schemas.microsoft.com/office/drawing/2014/main" id="{39FF631F-AFD0-429A-9A05-B78FD2951672}"/>
+                <a16:creationId xmlns:a16="http://schemas.microsoft.com/office/drawing/2014/main" xmlns="" id="{39FF631F-AFD0-429A-9A05-B78FD2951672}"/>
               </a:ext>
             </a:extLst>
           </p:cNvPr>
@@ -2387,7 +2393,7 @@
           <p:cNvPr id="5" name="Date Placeholder 4">
             <a:extLst>
               <a:ext uri="{FF2B5EF4-FFF2-40B4-BE49-F238E27FC236}">
-                <a16:creationId xmlns:a16="http://schemas.microsoft.com/office/drawing/2014/main" id="{50A49561-FD34-4904-A857-18A8529F7454}"/>
+                <a16:creationId xmlns:a16="http://schemas.microsoft.com/office/drawing/2014/main" xmlns="" id="{50A49561-FD34-4904-A857-18A8529F7454}"/>
               </a:ext>
             </a:extLst>
           </p:cNvPr>
@@ -2405,7 +2411,7 @@
           <a:p>
             <a:fld id="{2B0739BF-12DF-4C9B-B87C-6D53AC7E35F9}" type="datetimeFigureOut">
               <a:rPr lang="en-PH" smtClean="0"/>
-              <a:t>17/11/2021</a:t>
+              <a:t>11/12/2021</a:t>
             </a:fld>
             <a:endParaRPr lang="en-PH"/>
           </a:p>
@@ -2416,7 +2422,7 @@
           <p:cNvPr id="6" name="Footer Placeholder 5">
             <a:extLst>
               <a:ext uri="{FF2B5EF4-FFF2-40B4-BE49-F238E27FC236}">
-                <a16:creationId xmlns:a16="http://schemas.microsoft.com/office/drawing/2014/main" id="{DFDD6223-61CC-4DF8-92A1-0F6391327700}"/>
+                <a16:creationId xmlns:a16="http://schemas.microsoft.com/office/drawing/2014/main" xmlns="" id="{DFDD6223-61CC-4DF8-92A1-0F6391327700}"/>
               </a:ext>
             </a:extLst>
           </p:cNvPr>
@@ -2441,7 +2447,7 @@
           <p:cNvPr id="7" name="Slide Number Placeholder 6">
             <a:extLst>
               <a:ext uri="{FF2B5EF4-FFF2-40B4-BE49-F238E27FC236}">
-                <a16:creationId xmlns:a16="http://schemas.microsoft.com/office/drawing/2014/main" id="{B541AF4A-063C-4B06-9ED2-B4C0CD3863B9}"/>
+                <a16:creationId xmlns:a16="http://schemas.microsoft.com/office/drawing/2014/main" xmlns="" id="{B541AF4A-063C-4B06-9ED2-B4C0CD3863B9}"/>
               </a:ext>
             </a:extLst>
           </p:cNvPr>
@@ -2500,7 +2506,7 @@
           <p:cNvPr id="2" name="Title 1">
             <a:extLst>
               <a:ext uri="{FF2B5EF4-FFF2-40B4-BE49-F238E27FC236}">
-                <a16:creationId xmlns:a16="http://schemas.microsoft.com/office/drawing/2014/main" id="{AB54BCE7-CFB5-499A-B32F-927157825499}"/>
+                <a16:creationId xmlns:a16="http://schemas.microsoft.com/office/drawing/2014/main" xmlns="" id="{AB54BCE7-CFB5-499A-B32F-927157825499}"/>
               </a:ext>
             </a:extLst>
           </p:cNvPr>
@@ -2538,7 +2544,7 @@
           <p:cNvPr id="3" name="Picture Placeholder 2">
             <a:extLst>
               <a:ext uri="{FF2B5EF4-FFF2-40B4-BE49-F238E27FC236}">
-                <a16:creationId xmlns:a16="http://schemas.microsoft.com/office/drawing/2014/main" id="{9F7A5798-578C-4B8F-9A48-F9541227ED44}"/>
+                <a16:creationId xmlns:a16="http://schemas.microsoft.com/office/drawing/2014/main" xmlns="" id="{9F7A5798-578C-4B8F-9A48-F9541227ED44}"/>
               </a:ext>
             </a:extLst>
           </p:cNvPr>
@@ -2605,7 +2611,7 @@
           <p:cNvPr id="4" name="Text Placeholder 3">
             <a:extLst>
               <a:ext uri="{FF2B5EF4-FFF2-40B4-BE49-F238E27FC236}">
-                <a16:creationId xmlns:a16="http://schemas.microsoft.com/office/drawing/2014/main" id="{5B86AE0D-8FA3-42EB-9F0C-738F7DCFB787}"/>
+                <a16:creationId xmlns:a16="http://schemas.microsoft.com/office/drawing/2014/main" xmlns="" id="{5B86AE0D-8FA3-42EB-9F0C-738F7DCFB787}"/>
               </a:ext>
             </a:extLst>
           </p:cNvPr>
@@ -2676,7 +2682,7 @@
           <p:cNvPr id="5" name="Date Placeholder 4">
             <a:extLst>
               <a:ext uri="{FF2B5EF4-FFF2-40B4-BE49-F238E27FC236}">
-                <a16:creationId xmlns:a16="http://schemas.microsoft.com/office/drawing/2014/main" id="{5932336D-472A-4DE1-A47D-0EFB32AD4494}"/>
+                <a16:creationId xmlns:a16="http://schemas.microsoft.com/office/drawing/2014/main" xmlns="" id="{5932336D-472A-4DE1-A47D-0EFB32AD4494}"/>
               </a:ext>
             </a:extLst>
           </p:cNvPr>
@@ -2694,7 +2700,7 @@
           <a:p>
             <a:fld id="{2B0739BF-12DF-4C9B-B87C-6D53AC7E35F9}" type="datetimeFigureOut">
               <a:rPr lang="en-PH" smtClean="0"/>
-              <a:t>17/11/2021</a:t>
+              <a:t>11/12/2021</a:t>
             </a:fld>
             <a:endParaRPr lang="en-PH"/>
           </a:p>
@@ -2705,7 +2711,7 @@
           <p:cNvPr id="6" name="Footer Placeholder 5">
             <a:extLst>
               <a:ext uri="{FF2B5EF4-FFF2-40B4-BE49-F238E27FC236}">
-                <a16:creationId xmlns:a16="http://schemas.microsoft.com/office/drawing/2014/main" id="{487E2F8A-EAB0-4AE4-9421-B98C0519E601}"/>
+                <a16:creationId xmlns:a16="http://schemas.microsoft.com/office/drawing/2014/main" xmlns="" id="{487E2F8A-EAB0-4AE4-9421-B98C0519E601}"/>
               </a:ext>
             </a:extLst>
           </p:cNvPr>
@@ -2730,7 +2736,7 @@
           <p:cNvPr id="7" name="Slide Number Placeholder 6">
             <a:extLst>
               <a:ext uri="{FF2B5EF4-FFF2-40B4-BE49-F238E27FC236}">
-                <a16:creationId xmlns:a16="http://schemas.microsoft.com/office/drawing/2014/main" id="{CC3BB691-49F8-4B13-854A-A3331FB53EDD}"/>
+                <a16:creationId xmlns:a16="http://schemas.microsoft.com/office/drawing/2014/main" xmlns="" id="{CC3BB691-49F8-4B13-854A-A3331FB53EDD}"/>
               </a:ext>
             </a:extLst>
           </p:cNvPr>
@@ -2794,7 +2800,7 @@
           <p:cNvPr id="2" name="Title Placeholder 1">
             <a:extLst>
               <a:ext uri="{FF2B5EF4-FFF2-40B4-BE49-F238E27FC236}">
-                <a16:creationId xmlns:a16="http://schemas.microsoft.com/office/drawing/2014/main" id="{6008F105-2607-48C2-A7C8-2EDC4A8EEE30}"/>
+                <a16:creationId xmlns:a16="http://schemas.microsoft.com/office/drawing/2014/main" xmlns="" id="{6008F105-2607-48C2-A7C8-2EDC4A8EEE30}"/>
               </a:ext>
             </a:extLst>
           </p:cNvPr>
@@ -2833,7 +2839,7 @@
           <p:cNvPr id="3" name="Text Placeholder 2">
             <a:extLst>
               <a:ext uri="{FF2B5EF4-FFF2-40B4-BE49-F238E27FC236}">
-                <a16:creationId xmlns:a16="http://schemas.microsoft.com/office/drawing/2014/main" id="{2B2CB5FB-58D3-4C23-A62F-0731B625E3B0}"/>
+                <a16:creationId xmlns:a16="http://schemas.microsoft.com/office/drawing/2014/main" xmlns="" id="{2B2CB5FB-58D3-4C23-A62F-0731B625E3B0}"/>
               </a:ext>
             </a:extLst>
           </p:cNvPr>
@@ -2901,7 +2907,7 @@
           <p:cNvPr id="4" name="Date Placeholder 3">
             <a:extLst>
               <a:ext uri="{FF2B5EF4-FFF2-40B4-BE49-F238E27FC236}">
-                <a16:creationId xmlns:a16="http://schemas.microsoft.com/office/drawing/2014/main" id="{C8B44565-535C-4AAE-A37E-F04720C86F1A}"/>
+                <a16:creationId xmlns:a16="http://schemas.microsoft.com/office/drawing/2014/main" xmlns="" id="{C8B44565-535C-4AAE-A37E-F04720C86F1A}"/>
               </a:ext>
             </a:extLst>
           </p:cNvPr>
@@ -2937,7 +2943,7 @@
           <a:p>
             <a:fld id="{2B0739BF-12DF-4C9B-B87C-6D53AC7E35F9}" type="datetimeFigureOut">
               <a:rPr lang="en-PH" smtClean="0"/>
-              <a:t>17/11/2021</a:t>
+              <a:t>11/12/2021</a:t>
             </a:fld>
             <a:endParaRPr lang="en-PH"/>
           </a:p>
@@ -2948,7 +2954,7 @@
           <p:cNvPr id="5" name="Footer Placeholder 4">
             <a:extLst>
               <a:ext uri="{FF2B5EF4-FFF2-40B4-BE49-F238E27FC236}">
-                <a16:creationId xmlns:a16="http://schemas.microsoft.com/office/drawing/2014/main" id="{2A494202-CFF5-42B6-9234-791060B99DA0}"/>
+                <a16:creationId xmlns:a16="http://schemas.microsoft.com/office/drawing/2014/main" xmlns="" id="{2A494202-CFF5-42B6-9234-791060B99DA0}"/>
               </a:ext>
             </a:extLst>
           </p:cNvPr>
@@ -2991,7 +2997,7 @@
           <p:cNvPr id="6" name="Slide Number Placeholder 5">
             <a:extLst>
               <a:ext uri="{FF2B5EF4-FFF2-40B4-BE49-F238E27FC236}">
-                <a16:creationId xmlns:a16="http://schemas.microsoft.com/office/drawing/2014/main" id="{6E6533B8-24F9-4AAF-8051-EDB301F2DAEF}"/>
+                <a16:creationId xmlns:a16="http://schemas.microsoft.com/office/drawing/2014/main" xmlns="" id="{6E6533B8-24F9-4AAF-8051-EDB301F2DAEF}"/>
               </a:ext>
             </a:extLst>
           </p:cNvPr>
@@ -3359,7 +3365,7 @@
           <p:cNvPr id="4" name="Title 3">
             <a:extLst>
               <a:ext uri="{FF2B5EF4-FFF2-40B4-BE49-F238E27FC236}">
-                <a16:creationId xmlns:a16="http://schemas.microsoft.com/office/drawing/2014/main" id="{F648A512-3254-46D5-9114-9EF1B7E6C416}"/>
+                <a16:creationId xmlns:a16="http://schemas.microsoft.com/office/drawing/2014/main" xmlns="" id="{F648A512-3254-46D5-9114-9EF1B7E6C416}"/>
               </a:ext>
             </a:extLst>
           </p:cNvPr>
@@ -3396,7 +3402,7 @@
           <p:cNvPr id="1026" name="Picture 2" descr="https://lh5.googleusercontent.com/k0ka75QyLmyRzBNt_ss_Dp_PT1S_omCb7yv7pb9GIC9adRTVehPgl-2WFi5n0jnv8XGs4Be-UPd2XVXearVU4s-OS8VI0KftOxtNEVBgL8yHRjDKDilZR9MYhM0e4_HCuDplLkZK">
             <a:extLst>
               <a:ext uri="{FF2B5EF4-FFF2-40B4-BE49-F238E27FC236}">
-                <a16:creationId xmlns:a16="http://schemas.microsoft.com/office/drawing/2014/main" id="{79689B94-6429-45B0-ABE0-466A4DB046B9}"/>
+                <a16:creationId xmlns:a16="http://schemas.microsoft.com/office/drawing/2014/main" xmlns="" id="{79689B94-6429-45B0-ABE0-466A4DB046B9}"/>
               </a:ext>
             </a:extLst>
           </p:cNvPr>
@@ -3475,7 +3481,118 @@
           <p:cNvPr id="2" name="Title 1">
             <a:extLst>
               <a:ext uri="{FF2B5EF4-FFF2-40B4-BE49-F238E27FC236}">
-                <a16:creationId xmlns:a16="http://schemas.microsoft.com/office/drawing/2014/main" id="{66BD01D8-4A6E-482F-B4AE-78F7EF4C6335}"/>
+                <a16:creationId xmlns:a16="http://schemas.microsoft.com/office/drawing/2014/main" xmlns="" id="{57CDDC86-386E-4980-A0FC-215F181CBC6A}"/>
+              </a:ext>
+            </a:extLst>
+          </p:cNvPr>
+          <p:cNvSpPr>
+            <a:spLocks noGrp="1"/>
+          </p:cNvSpPr>
+          <p:nvPr>
+            <p:ph type="title"/>
+          </p:nvPr>
+        </p:nvSpPr>
+        <p:spPr>
+          <a:xfrm>
+            <a:off x="838200" y="365126"/>
+            <a:ext cx="10515600" cy="315912"/>
+          </a:xfrm>
+        </p:spPr>
+        <p:txBody>
+          <a:bodyPr>
+            <a:normAutofit fontScale="90000"/>
+          </a:bodyPr>
+          <a:lstStyle/>
+          <a:p>
+            <a:endParaRPr lang="en-PH" dirty="0"/>
+          </a:p>
+        </p:txBody>
+      </p:sp>
+      <p:pic>
+        <p:nvPicPr>
+          <p:cNvPr id="8194" name="Picture 2" descr="https://lh3.googleusercontent.com/aBOGMVgazZ1XfXx-3sVL7ukGzbaMRtbghPxAmi6me6dstBmaCCZoMuP6ZoSpMziaQrC9YccSAYIDXW11AoKHKtKxs94EwBPmBbn8ARg6Vubny0m5npGvsSdtVUgLixDOcIuVVAq0">
+            <a:extLst>
+              <a:ext uri="{FF2B5EF4-FFF2-40B4-BE49-F238E27FC236}">
+                <a16:creationId xmlns:a16="http://schemas.microsoft.com/office/drawing/2014/main" xmlns="" id="{80818460-1F16-4F1A-A32C-4C0BBF598DB5}"/>
+              </a:ext>
+            </a:extLst>
+          </p:cNvPr>
+          <p:cNvPicPr>
+            <a:picLocks noGrp="1" noChangeAspect="1" noChangeArrowheads="1"/>
+          </p:cNvPicPr>
+          <p:nvPr>
+            <p:ph idx="1"/>
+          </p:nvPr>
+        </p:nvPicPr>
+        <p:blipFill>
+          <a:blip r:embed="rId2">
+            <a:extLst>
+              <a:ext uri="{28A0092B-C50C-407E-A947-70E740481C1C}">
+                <a14:useLocalDpi xmlns:a14="http://schemas.microsoft.com/office/drawing/2010/main" val="0"/>
+              </a:ext>
+            </a:extLst>
+          </a:blip>
+          <a:srcRect/>
+          <a:stretch>
+            <a:fillRect/>
+          </a:stretch>
+        </p:blipFill>
+        <p:spPr bwMode="auto">
+          <a:xfrm>
+            <a:off x="1591764" y="878888"/>
+            <a:ext cx="8640762" cy="5613985"/>
+          </a:xfrm>
+          <a:prstGeom prst="rect">
+            <a:avLst/>
+          </a:prstGeom>
+          <a:noFill/>
+          <a:extLst>
+            <a:ext uri="{909E8E84-426E-40DD-AFC4-6F175D3DCCD1}">
+              <a14:hiddenFill xmlns:a14="http://schemas.microsoft.com/office/drawing/2010/main">
+                <a:solidFill>
+                  <a:srgbClr val="FFFFFF"/>
+                </a:solidFill>
+              </a14:hiddenFill>
+            </a:ext>
+          </a:extLst>
+        </p:spPr>
+      </p:pic>
+    </p:spTree>
+    <p:extLst>
+      <p:ext uri="{BB962C8B-B14F-4D97-AF65-F5344CB8AC3E}">
+        <p14:creationId xmlns:p14="http://schemas.microsoft.com/office/powerpoint/2010/main" val="540807688"/>
+      </p:ext>
+    </p:extLst>
+  </p:cSld>
+  <p:clrMapOvr>
+    <a:masterClrMapping/>
+  </p:clrMapOvr>
+</p:sld>
+</file>
+
+<file path=ppt/slides/slide11.xml><?xml version="1.0" encoding="utf-8"?>
+<p:sld xmlns:a="http://schemas.openxmlformats.org/drawingml/2006/main" xmlns:r="http://schemas.openxmlformats.org/officeDocument/2006/relationships" xmlns:p="http://schemas.openxmlformats.org/presentationml/2006/main">
+  <p:cSld>
+    <p:spTree>
+      <p:nvGrpSpPr>
+        <p:cNvPr id="1" name=""/>
+        <p:cNvGrpSpPr/>
+        <p:nvPr/>
+      </p:nvGrpSpPr>
+      <p:grpSpPr>
+        <a:xfrm>
+          <a:off x="0" y="0"/>
+          <a:ext cx="0" cy="0"/>
+          <a:chOff x="0" y="0"/>
+          <a:chExt cx="0" cy="0"/>
+        </a:xfrm>
+      </p:grpSpPr>
+      <p:sp>
+        <p:nvSpPr>
+          <p:cNvPr id="2" name="Title 1">
+            <a:extLst>
+              <a:ext uri="{FF2B5EF4-FFF2-40B4-BE49-F238E27FC236}">
+                <a16:creationId xmlns:a16="http://schemas.microsoft.com/office/drawing/2014/main" xmlns="" id="{66BD01D8-4A6E-482F-B4AE-78F7EF4C6335}"/>
               </a:ext>
             </a:extLst>
           </p:cNvPr>
@@ -3507,7 +3624,7 @@
           <p:cNvPr id="9218" name="Picture 2" descr="https://lh5.googleusercontent.com/V0TDOcwP-h1_5cblxy-lYNmRpkhXZ6SHspr-SCSzJ7MV654i8Gg_qXm2eldN7v0F6auwj5PtEmrEu-2Xj1sjP_RWmwCtNa4XYO8ciqEe9VratNCmZvalHVHbfWRpEBZsmgOKG0wm">
             <a:extLst>
               <a:ext uri="{FF2B5EF4-FFF2-40B4-BE49-F238E27FC236}">
-                <a16:creationId xmlns:a16="http://schemas.microsoft.com/office/drawing/2014/main" id="{591AF7E1-6C37-4390-984F-B5B9E7D485AF}"/>
+                <a16:creationId xmlns:a16="http://schemas.microsoft.com/office/drawing/2014/main" xmlns="" id="{591AF7E1-6C37-4390-984F-B5B9E7D485AF}"/>
               </a:ext>
             </a:extLst>
           </p:cNvPr>
@@ -3564,7 +3681,7 @@
 </p:sld>
 </file>
 
-<file path=ppt/slides/slide11.xml><?xml version="1.0" encoding="utf-8"?>
+<file path=ppt/slides/slide12.xml><?xml version="1.0" encoding="utf-8"?>
 <p:sld xmlns:a="http://schemas.openxmlformats.org/drawingml/2006/main" xmlns:r="http://schemas.openxmlformats.org/officeDocument/2006/relationships" xmlns:p="http://schemas.openxmlformats.org/presentationml/2006/main">
   <p:cSld>
     <p:spTree>
@@ -3586,7 +3703,7 @@
           <p:cNvPr id="2" name="Title 1">
             <a:extLst>
               <a:ext uri="{FF2B5EF4-FFF2-40B4-BE49-F238E27FC236}">
-                <a16:creationId xmlns:a16="http://schemas.microsoft.com/office/drawing/2014/main" id="{EC184F7B-4EA4-4A43-BA45-9199B16F73F7}"/>
+                <a16:creationId xmlns:a16="http://schemas.microsoft.com/office/drawing/2014/main" xmlns="" id="{EC184F7B-4EA4-4A43-BA45-9199B16F73F7}"/>
               </a:ext>
             </a:extLst>
           </p:cNvPr>
@@ -3628,7 +3745,7 @@
           <p:cNvPr id="10242" name="Picture 2" descr="https://lh5.googleusercontent.com/M27MpBZficrl7BJrYYaj324s_l6HXSO_N1MJ_Xw55uS-_pfA-eKv8vuWRLMUr3v7WQLYEdy39FPIaCDQMk80n95pa6fvNXlAUHE17SkhV9jhqiHsaRGHuAJ10Lq_g2dXjQf6NE5O">
             <a:extLst>
               <a:ext uri="{FF2B5EF4-FFF2-40B4-BE49-F238E27FC236}">
-                <a16:creationId xmlns:a16="http://schemas.microsoft.com/office/drawing/2014/main" id="{B217D8F4-0C5A-434D-9CFC-741F3C1DFFE7}"/>
+                <a16:creationId xmlns:a16="http://schemas.microsoft.com/office/drawing/2014/main" xmlns="" id="{B217D8F4-0C5A-434D-9CFC-741F3C1DFFE7}"/>
               </a:ext>
             </a:extLst>
           </p:cNvPr>
@@ -3685,7 +3802,7 @@
 </p:sld>
 </file>
 
-<file path=ppt/slides/slide12.xml><?xml version="1.0" encoding="utf-8"?>
+<file path=ppt/slides/slide13.xml><?xml version="1.0" encoding="utf-8"?>
 <p:sld xmlns:a="http://schemas.openxmlformats.org/drawingml/2006/main" xmlns:r="http://schemas.openxmlformats.org/officeDocument/2006/relationships" xmlns:p="http://schemas.openxmlformats.org/presentationml/2006/main">
   <p:cSld>
     <p:spTree>
@@ -3707,7 +3824,7 @@
           <p:cNvPr id="2" name="Title 1">
             <a:extLst>
               <a:ext uri="{FF2B5EF4-FFF2-40B4-BE49-F238E27FC236}">
-                <a16:creationId xmlns:a16="http://schemas.microsoft.com/office/drawing/2014/main" id="{EC77AD5F-28CC-4934-BC8E-910FB5598CD0}"/>
+                <a16:creationId xmlns:a16="http://schemas.microsoft.com/office/drawing/2014/main" xmlns="" id="{EC77AD5F-28CC-4934-BC8E-910FB5598CD0}"/>
               </a:ext>
             </a:extLst>
           </p:cNvPr>
@@ -3749,7 +3866,7 @@
           <p:cNvPr id="11266" name="Picture 2" descr="https://lh4.googleusercontent.com/HVCXbWksoQJSfh1cP765RzVdOljQ_U3WRmtMRsGhG6njF5JJbUtaJZ1_qKdKHDTF480xCjcOPPBB4WNcWu97xdDOXujS0-cO8QReSEF3noFeu1ya9fuECc9leGiwmXSZdbRbsntt">
             <a:extLst>
               <a:ext uri="{FF2B5EF4-FFF2-40B4-BE49-F238E27FC236}">
-                <a16:creationId xmlns:a16="http://schemas.microsoft.com/office/drawing/2014/main" id="{47EB5934-9190-44A9-A534-977E2DFEEB21}"/>
+                <a16:creationId xmlns:a16="http://schemas.microsoft.com/office/drawing/2014/main" xmlns="" id="{47EB5934-9190-44A9-A534-977E2DFEEB21}"/>
               </a:ext>
             </a:extLst>
           </p:cNvPr>
@@ -3806,7 +3923,7 @@
 </p:sld>
 </file>
 
-<file path=ppt/slides/slide13.xml><?xml version="1.0" encoding="utf-8"?>
+<file path=ppt/slides/slide14.xml><?xml version="1.0" encoding="utf-8"?>
 <p:sld xmlns:a="http://schemas.openxmlformats.org/drawingml/2006/main" xmlns:r="http://schemas.openxmlformats.org/officeDocument/2006/relationships" xmlns:p="http://schemas.openxmlformats.org/presentationml/2006/main">
   <p:cSld>
     <p:spTree>
@@ -3828,7 +3945,7 @@
           <p:cNvPr id="2" name="Title 1">
             <a:extLst>
               <a:ext uri="{FF2B5EF4-FFF2-40B4-BE49-F238E27FC236}">
-                <a16:creationId xmlns:a16="http://schemas.microsoft.com/office/drawing/2014/main" id="{F3B89993-38B2-4856-9A6A-B11039CFD05E}"/>
+                <a16:creationId xmlns:a16="http://schemas.microsoft.com/office/drawing/2014/main" xmlns="" id="{F3B89993-38B2-4856-9A6A-B11039CFD05E}"/>
               </a:ext>
             </a:extLst>
           </p:cNvPr>
@@ -3870,7 +3987,7 @@
           <p:cNvPr id="12290" name="Picture 2" descr="https://lh5.googleusercontent.com/bk1cFCsNXJOtoUUJOKgJm0OnwoADfFrPs59h0-cTZHUrVnKBNS41vJRAsr6iXXgfT7C3qwneq9who7-ClvwXRA8t4sBueQOvQau1ey-fbeoEhkiKtB1ecjhYCw7JfpucjSlRjIcX">
             <a:extLst>
               <a:ext uri="{FF2B5EF4-FFF2-40B4-BE49-F238E27FC236}">
-                <a16:creationId xmlns:a16="http://schemas.microsoft.com/office/drawing/2014/main" id="{D7CDAFB2-4D4A-49DC-98EC-F4721BCFEC92}"/>
+                <a16:creationId xmlns:a16="http://schemas.microsoft.com/office/drawing/2014/main" xmlns="" id="{D7CDAFB2-4D4A-49DC-98EC-F4721BCFEC92}"/>
               </a:ext>
             </a:extLst>
           </p:cNvPr>
@@ -3949,7 +4066,7 @@
           <p:cNvPr id="2" name="Title 1">
             <a:extLst>
               <a:ext uri="{FF2B5EF4-FFF2-40B4-BE49-F238E27FC236}">
-                <a16:creationId xmlns:a16="http://schemas.microsoft.com/office/drawing/2014/main" id="{D00B1FDA-5905-44C9-A430-CF1928511741}"/>
+                <a16:creationId xmlns:a16="http://schemas.microsoft.com/office/drawing/2014/main" xmlns="" id="{D00B1FDA-5905-44C9-A430-CF1928511741}"/>
               </a:ext>
             </a:extLst>
           </p:cNvPr>
@@ -3989,7 +4106,7 @@
           <p:cNvPr id="2050" name="Picture 2" descr="https://lh4.googleusercontent.com/PlZOV5dm78EagjR6xoD0bJjxRKa7tS0-bBZmZhlk9AIPIPCIKuyq_PWnY9s8a3FxvDpWtOCUeBYpRrxuwA0nJ0kQ9-t0IEsyKtzbHWNuepiI0ASu9ezyWSubH6E5A2CBLW_0-epl">
             <a:extLst>
               <a:ext uri="{FF2B5EF4-FFF2-40B4-BE49-F238E27FC236}">
-                <a16:creationId xmlns:a16="http://schemas.microsoft.com/office/drawing/2014/main" id="{BD3C988A-F83D-45E9-AC4B-D766B6FF8BFB}"/>
+                <a16:creationId xmlns:a16="http://schemas.microsoft.com/office/drawing/2014/main" xmlns="" id="{BD3C988A-F83D-45E9-AC4B-D766B6FF8BFB}"/>
               </a:ext>
             </a:extLst>
           </p:cNvPr>
@@ -4068,7 +4185,7 @@
           <p:cNvPr id="2" name="Title 1">
             <a:extLst>
               <a:ext uri="{FF2B5EF4-FFF2-40B4-BE49-F238E27FC236}">
-                <a16:creationId xmlns:a16="http://schemas.microsoft.com/office/drawing/2014/main" id="{1E049BA8-B763-4E36-864D-A0B2E13560FF}"/>
+                <a16:creationId xmlns:a16="http://schemas.microsoft.com/office/drawing/2014/main" xmlns="" id="{1E049BA8-B763-4E36-864D-A0B2E13560FF}"/>
               </a:ext>
             </a:extLst>
           </p:cNvPr>
@@ -4108,7 +4225,7 @@
           <p:cNvPr id="3074" name="Picture 2" descr="https://lh4.googleusercontent.com/9SXUSKedBMYHjwPCL0bCLJjU5GDUQlMl1Yqsz4TiDS3k8SQOcFkxFIkR7IFeCjIjGPxa-lYIIfjr75xqPEa3_mA4tGex8uxAE-setAputAq3V2ihcx5FyN7Cy_fqa76wsTZrS-K7">
             <a:extLst>
               <a:ext uri="{FF2B5EF4-FFF2-40B4-BE49-F238E27FC236}">
-                <a16:creationId xmlns:a16="http://schemas.microsoft.com/office/drawing/2014/main" id="{26E9FD42-E5F4-4716-9A53-2DF3D9CC19E0}"/>
+                <a16:creationId xmlns:a16="http://schemas.microsoft.com/office/drawing/2014/main" xmlns="" id="{26E9FD42-E5F4-4716-9A53-2DF3D9CC19E0}"/>
               </a:ext>
             </a:extLst>
           </p:cNvPr>
@@ -4187,7 +4304,7 @@
           <p:cNvPr id="2" name="Title 1">
             <a:extLst>
               <a:ext uri="{FF2B5EF4-FFF2-40B4-BE49-F238E27FC236}">
-                <a16:creationId xmlns:a16="http://schemas.microsoft.com/office/drawing/2014/main" id="{8A5149EB-64CA-443A-B612-AD019FA6332B}"/>
+                <a16:creationId xmlns:a16="http://schemas.microsoft.com/office/drawing/2014/main" xmlns="" id="{8A5149EB-64CA-443A-B612-AD019FA6332B}"/>
               </a:ext>
             </a:extLst>
           </p:cNvPr>
@@ -4227,7 +4344,7 @@
           <p:cNvPr id="4098" name="Picture 2" descr="https://lh3.googleusercontent.com/A5ohAD54eiUQjinakvpQc8Rz_43GEf2ut1LHppfgW04JmIW2e4h_eryqlCZTUSpqZY3zct4iD56po2lOHImKqu89VNzyGP9O1tD0uUDMDYoQ3k94BiWOfiiEhmxu8tZFTQAVCr_E">
             <a:extLst>
               <a:ext uri="{FF2B5EF4-FFF2-40B4-BE49-F238E27FC236}">
-                <a16:creationId xmlns:a16="http://schemas.microsoft.com/office/drawing/2014/main" id="{66C554D8-8952-410A-95D1-0BAD911CE82B}"/>
+                <a16:creationId xmlns:a16="http://schemas.microsoft.com/office/drawing/2014/main" xmlns="" id="{66C554D8-8952-410A-95D1-0BAD911CE82B}"/>
               </a:ext>
             </a:extLst>
           </p:cNvPr>
@@ -4306,7 +4423,7 @@
           <p:cNvPr id="2" name="Title 1">
             <a:extLst>
               <a:ext uri="{FF2B5EF4-FFF2-40B4-BE49-F238E27FC236}">
-                <a16:creationId xmlns:a16="http://schemas.microsoft.com/office/drawing/2014/main" id="{05971CF0-A7A1-40FF-973F-198FAA4EABA8}"/>
+                <a16:creationId xmlns:a16="http://schemas.microsoft.com/office/drawing/2014/main" xmlns="" id="{05971CF0-A7A1-40FF-973F-198FAA4EABA8}"/>
               </a:ext>
             </a:extLst>
           </p:cNvPr>
@@ -4346,7 +4463,7 @@
           <p:cNvPr id="5122" name="Picture 2" descr="https://lh6.googleusercontent.com/QLujRPJ2gfyJs0U2iGl1S4LyUPNi1nHpx28WL2UKq6qNO494l-ojXDRbJUDymmlGTjCyc-JD6lqopGieIZ0W7dDcfux8DNDbfPEGd0wh1RQN3gDap9pIfT0PXCHqh4FQeiBxb0Ua">
             <a:extLst>
               <a:ext uri="{FF2B5EF4-FFF2-40B4-BE49-F238E27FC236}">
-                <a16:creationId xmlns:a16="http://schemas.microsoft.com/office/drawing/2014/main" id="{A7896D39-1E57-47C7-BF42-4EE92F077295}"/>
+                <a16:creationId xmlns:a16="http://schemas.microsoft.com/office/drawing/2014/main" xmlns="" id="{A7896D39-1E57-47C7-BF42-4EE92F077295}"/>
               </a:ext>
             </a:extLst>
           </p:cNvPr>
@@ -4425,7 +4542,7 @@
           <p:cNvPr id="2" name="Title 1">
             <a:extLst>
               <a:ext uri="{FF2B5EF4-FFF2-40B4-BE49-F238E27FC236}">
-                <a16:creationId xmlns:a16="http://schemas.microsoft.com/office/drawing/2014/main" id="{2D8ABA17-C7A6-4F00-9DDF-20AE24F496E6}"/>
+                <a16:creationId xmlns:a16="http://schemas.microsoft.com/office/drawing/2014/main" xmlns="" id="{2D8ABA17-C7A6-4F00-9DDF-20AE24F496E6}"/>
               </a:ext>
             </a:extLst>
           </p:cNvPr>
@@ -4465,7 +4582,7 @@
           <p:cNvPr id="6146" name="Picture 2" descr="https://lh6.googleusercontent.com/yd3BL-KBHQgONJ_knhf2YSojNoiO4oC-ftSU15BaXo-IbZ15mfMXZATY0ttcTmGDI9B6-xqYhdATAVxyQylejnl09_o6zIw6txuSwgxgNhdSsbbdVafq5lBB5MI1LoteH7V00i4i">
             <a:extLst>
               <a:ext uri="{FF2B5EF4-FFF2-40B4-BE49-F238E27FC236}">
-                <a16:creationId xmlns:a16="http://schemas.microsoft.com/office/drawing/2014/main" id="{BF936717-070B-4539-BF84-D55F08F5D8A5}"/>
+                <a16:creationId xmlns:a16="http://schemas.microsoft.com/office/drawing/2014/main" xmlns="" id="{BF936717-070B-4539-BF84-D55F08F5D8A5}"/>
               </a:ext>
             </a:extLst>
           </p:cNvPr>
@@ -4541,10 +4658,91 @@
       </p:grpSpPr>
       <p:sp>
         <p:nvSpPr>
+          <p:cNvPr id="3" name="Content Placeholder 2"/>
+          <p:cNvSpPr>
+            <a:spLocks noGrp="1"/>
+          </p:cNvSpPr>
+          <p:nvPr>
+            <p:ph idx="1"/>
+          </p:nvPr>
+        </p:nvSpPr>
+        <p:spPr/>
+        <p:txBody>
+          <a:bodyPr/>
+          <a:lstStyle/>
+          <a:p>
+            <a:r>
+              <a:rPr lang="en-US" dirty="0" err="1" smtClean="0"/>
+              <a:t>Kanus</a:t>
+            </a:r>
+            <a:r>
+              <a:rPr lang="en-US" dirty="0" smtClean="0"/>
+              <a:t> a </a:t>
+            </a:r>
+            <a:r>
+              <a:rPr lang="en-US" dirty="0" err="1" smtClean="0"/>
+              <a:t>kuhaon</a:t>
+            </a:r>
+            <a:r>
+              <a:rPr lang="en-US" dirty="0" smtClean="0"/>
+              <a:t> </a:t>
+            </a:r>
+            <a:r>
+              <a:rPr lang="en-US" dirty="0" err="1" smtClean="0"/>
+              <a:t>ang</a:t>
+            </a:r>
+            <a:r>
+              <a:rPr lang="en-US" dirty="0" smtClean="0"/>
+              <a:t> animal </a:t>
+            </a:r>
+            <a:r>
+              <a:rPr lang="en-US" dirty="0" err="1" smtClean="0"/>
+              <a:t>sa</a:t>
+            </a:r>
+            <a:r>
+              <a:rPr lang="en-US" dirty="0" smtClean="0"/>
+              <a:t> certain farmer</a:t>
+            </a:r>
+            <a:endParaRPr lang="en-US" dirty="0"/>
+          </a:p>
+        </p:txBody>
+      </p:sp>
+    </p:spTree>
+    <p:extLst>
+      <p:ext uri="{BB962C8B-B14F-4D97-AF65-F5344CB8AC3E}">
+        <p14:creationId xmlns:p14="http://schemas.microsoft.com/office/powerpoint/2010/main" val="3380095540"/>
+      </p:ext>
+    </p:extLst>
+  </p:cSld>
+  <p:clrMapOvr>
+    <a:masterClrMapping/>
+  </p:clrMapOvr>
+</p:sld>
+</file>
+
+<file path=ppt/slides/slide8.xml><?xml version="1.0" encoding="utf-8"?>
+<p:sld xmlns:a="http://schemas.openxmlformats.org/drawingml/2006/main" xmlns:r="http://schemas.openxmlformats.org/officeDocument/2006/relationships" xmlns:p="http://schemas.openxmlformats.org/presentationml/2006/main">
+  <p:cSld>
+    <p:spTree>
+      <p:nvGrpSpPr>
+        <p:cNvPr id="1" name=""/>
+        <p:cNvGrpSpPr/>
+        <p:nvPr/>
+      </p:nvGrpSpPr>
+      <p:grpSpPr>
+        <a:xfrm>
+          <a:off x="0" y="0"/>
+          <a:ext cx="0" cy="0"/>
+          <a:chOff x="0" y="0"/>
+          <a:chExt cx="0" cy="0"/>
+        </a:xfrm>
+      </p:grpSpPr>
+      <p:sp>
+        <p:nvSpPr>
           <p:cNvPr id="2" name="Title 1">
             <a:extLst>
               <a:ext uri="{FF2B5EF4-FFF2-40B4-BE49-F238E27FC236}">
-                <a16:creationId xmlns:a16="http://schemas.microsoft.com/office/drawing/2014/main" id="{E5171B7E-C1B1-4E6F-BDE9-47BD8B3FF3B0}"/>
+                <a16:creationId xmlns:a16="http://schemas.microsoft.com/office/drawing/2014/main" xmlns="" id="{E5171B7E-C1B1-4E6F-BDE9-47BD8B3FF3B0}"/>
               </a:ext>
             </a:extLst>
           </p:cNvPr>
@@ -4584,7 +4782,7 @@
           <p:cNvPr id="7170" name="Picture 2" descr="https://lh3.googleusercontent.com/60gWZyRZ1Uyn4tNrTEhtuoyXHPff5r6CCM36mdWqF-3MR1LNjltOyxPA26AKcbQGyUYbCiTSxO1iD7QTAvHclDHkR-WZxjqGm7p7DdN_M6COkflb0ighbjunpa64dX4dJPIJHGNx">
             <a:extLst>
               <a:ext uri="{FF2B5EF4-FFF2-40B4-BE49-F238E27FC236}">
-                <a16:creationId xmlns:a16="http://schemas.microsoft.com/office/drawing/2014/main" id="{CDA20A68-669F-4637-8F2C-1DFB56C185B8}"/>
+                <a16:creationId xmlns:a16="http://schemas.microsoft.com/office/drawing/2014/main" xmlns="" id="{CDA20A68-669F-4637-8F2C-1DFB56C185B8}"/>
               </a:ext>
             </a:extLst>
           </p:cNvPr>
@@ -4641,7 +4839,7 @@
 </p:sld>
 </file>
 
-<file path=ppt/slides/slide8.xml><?xml version="1.0" encoding="utf-8"?>
+<file path=ppt/slides/slide9.xml><?xml version="1.0" encoding="utf-8"?>
 <p:sld xmlns:a="http://schemas.openxmlformats.org/drawingml/2006/main" xmlns:r="http://schemas.openxmlformats.org/officeDocument/2006/relationships" xmlns:p="http://schemas.openxmlformats.org/presentationml/2006/main">
   <p:cSld>
     <p:spTree>
@@ -4663,7 +4861,7 @@
           <p:cNvPr id="2" name="Title 1">
             <a:extLst>
               <a:ext uri="{FF2B5EF4-FFF2-40B4-BE49-F238E27FC236}">
-                <a16:creationId xmlns:a16="http://schemas.microsoft.com/office/drawing/2014/main" id="{02543F98-A87F-4A6D-B1AF-827DBF2A9C33}"/>
+                <a16:creationId xmlns:a16="http://schemas.microsoft.com/office/drawing/2014/main" xmlns="" id="{02543F98-A87F-4A6D-B1AF-827DBF2A9C33}"/>
               </a:ext>
             </a:extLst>
           </p:cNvPr>
@@ -4695,7 +4893,7 @@
           <p:cNvPr id="4" name="Content Placeholder 3">
             <a:extLst>
               <a:ext uri="{FF2B5EF4-FFF2-40B4-BE49-F238E27FC236}">
-                <a16:creationId xmlns:a16="http://schemas.microsoft.com/office/drawing/2014/main" id="{DFC41F5F-662C-40BA-B920-C071D6F9D38A}"/>
+                <a16:creationId xmlns:a16="http://schemas.microsoft.com/office/drawing/2014/main" xmlns="" id="{DFC41F5F-662C-40BA-B920-C071D6F9D38A}"/>
               </a:ext>
             </a:extLst>
           </p:cNvPr>
@@ -4726,117 +4924,6 @@
     <p:extLst>
       <p:ext uri="{BB962C8B-B14F-4D97-AF65-F5344CB8AC3E}">
         <p14:creationId xmlns:p14="http://schemas.microsoft.com/office/powerpoint/2010/main" val="1606738135"/>
-      </p:ext>
-    </p:extLst>
-  </p:cSld>
-  <p:clrMapOvr>
-    <a:masterClrMapping/>
-  </p:clrMapOvr>
-</p:sld>
-</file>
-
-<file path=ppt/slides/slide9.xml><?xml version="1.0" encoding="utf-8"?>
-<p:sld xmlns:a="http://schemas.openxmlformats.org/drawingml/2006/main" xmlns:r="http://schemas.openxmlformats.org/officeDocument/2006/relationships" xmlns:p="http://schemas.openxmlformats.org/presentationml/2006/main">
-  <p:cSld>
-    <p:spTree>
-      <p:nvGrpSpPr>
-        <p:cNvPr id="1" name=""/>
-        <p:cNvGrpSpPr/>
-        <p:nvPr/>
-      </p:nvGrpSpPr>
-      <p:grpSpPr>
-        <a:xfrm>
-          <a:off x="0" y="0"/>
-          <a:ext cx="0" cy="0"/>
-          <a:chOff x="0" y="0"/>
-          <a:chExt cx="0" cy="0"/>
-        </a:xfrm>
-      </p:grpSpPr>
-      <p:sp>
-        <p:nvSpPr>
-          <p:cNvPr id="2" name="Title 1">
-            <a:extLst>
-              <a:ext uri="{FF2B5EF4-FFF2-40B4-BE49-F238E27FC236}">
-                <a16:creationId xmlns:a16="http://schemas.microsoft.com/office/drawing/2014/main" id="{57CDDC86-386E-4980-A0FC-215F181CBC6A}"/>
-              </a:ext>
-            </a:extLst>
-          </p:cNvPr>
-          <p:cNvSpPr>
-            <a:spLocks noGrp="1"/>
-          </p:cNvSpPr>
-          <p:nvPr>
-            <p:ph type="title"/>
-          </p:nvPr>
-        </p:nvSpPr>
-        <p:spPr>
-          <a:xfrm>
-            <a:off x="838200" y="365126"/>
-            <a:ext cx="10515600" cy="315912"/>
-          </a:xfrm>
-        </p:spPr>
-        <p:txBody>
-          <a:bodyPr>
-            <a:normAutofit fontScale="90000"/>
-          </a:bodyPr>
-          <a:lstStyle/>
-          <a:p>
-            <a:endParaRPr lang="en-PH" dirty="0"/>
-          </a:p>
-        </p:txBody>
-      </p:sp>
-      <p:pic>
-        <p:nvPicPr>
-          <p:cNvPr id="8194" name="Picture 2" descr="https://lh3.googleusercontent.com/aBOGMVgazZ1XfXx-3sVL7ukGzbaMRtbghPxAmi6me6dstBmaCCZoMuP6ZoSpMziaQrC9YccSAYIDXW11AoKHKtKxs94EwBPmBbn8ARg6Vubny0m5npGvsSdtVUgLixDOcIuVVAq0">
-            <a:extLst>
-              <a:ext uri="{FF2B5EF4-FFF2-40B4-BE49-F238E27FC236}">
-                <a16:creationId xmlns:a16="http://schemas.microsoft.com/office/drawing/2014/main" id="{80818460-1F16-4F1A-A32C-4C0BBF598DB5}"/>
-              </a:ext>
-            </a:extLst>
-          </p:cNvPr>
-          <p:cNvPicPr>
-            <a:picLocks noGrp="1" noChangeAspect="1" noChangeArrowheads="1"/>
-          </p:cNvPicPr>
-          <p:nvPr>
-            <p:ph idx="1"/>
-          </p:nvPr>
-        </p:nvPicPr>
-        <p:blipFill>
-          <a:blip r:embed="rId2">
-            <a:extLst>
-              <a:ext uri="{28A0092B-C50C-407E-A947-70E740481C1C}">
-                <a14:useLocalDpi xmlns:a14="http://schemas.microsoft.com/office/drawing/2010/main" val="0"/>
-              </a:ext>
-            </a:extLst>
-          </a:blip>
-          <a:srcRect/>
-          <a:stretch>
-            <a:fillRect/>
-          </a:stretch>
-        </p:blipFill>
-        <p:spPr bwMode="auto">
-          <a:xfrm>
-            <a:off x="1591764" y="878888"/>
-            <a:ext cx="8640762" cy="5613985"/>
-          </a:xfrm>
-          <a:prstGeom prst="rect">
-            <a:avLst/>
-          </a:prstGeom>
-          <a:noFill/>
-          <a:extLst>
-            <a:ext uri="{909E8E84-426E-40DD-AFC4-6F175D3DCCD1}">
-              <a14:hiddenFill xmlns:a14="http://schemas.microsoft.com/office/drawing/2010/main">
-                <a:solidFill>
-                  <a:srgbClr val="FFFFFF"/>
-                </a:solidFill>
-              </a14:hiddenFill>
-            </a:ext>
-          </a:extLst>
-        </p:spPr>
-      </p:pic>
-    </p:spTree>
-    <p:extLst>
-      <p:ext uri="{BB962C8B-B14F-4D97-AF65-F5344CB8AC3E}">
-        <p14:creationId xmlns:p14="http://schemas.microsoft.com/office/powerpoint/2010/main" val="540807688"/>
       </p:ext>
     </p:extLst>
   </p:cSld>

</xml_diff>